<commit_message>
UC-01 Simplified Activity Diagram
</commit_message>
<xml_diff>
--- a/08-Art/ppt/WhoDoesWhat.pptx
+++ b/08-Art/ppt/WhoDoesWhat.pptx
@@ -6,6 +6,7 @@
   </p:sldMasterIdLst>
   <p:sldIdLst>
     <p:sldId id="257" r:id="rId2"/>
+    <p:sldId id="259" r:id="rId3"/>
   </p:sldIdLst>
   <p:sldSz cx="12192000" cy="6858000"/>
   <p:notesSz cx="6858000" cy="9144000"/>
@@ -243,7 +244,7 @@
           <a:p>
             <a:fld id="{46EBF78D-C51E-41E0-96A2-F35EA2168B7C}" type="datetimeFigureOut">
               <a:rPr lang="es-ES" smtClean="0"/>
-              <a:t>25/02/2019</a:t>
+              <a:t>01/07/2019</a:t>
             </a:fld>
             <a:endParaRPr lang="es-ES"/>
           </a:p>
@@ -285,7 +286,7 @@
           <a:p>
             <a:fld id="{9CE34BDE-E087-4BFD-B407-AA69D846F212}" type="slidenum">
               <a:rPr lang="es-ES" smtClean="0"/>
-              <a:t>‹Nº›</a:t>
+              <a:t>‹#›</a:t>
             </a:fld>
             <a:endParaRPr lang="es-ES"/>
           </a:p>
@@ -413,7 +414,7 @@
           <a:p>
             <a:fld id="{46EBF78D-C51E-41E0-96A2-F35EA2168B7C}" type="datetimeFigureOut">
               <a:rPr lang="es-ES" smtClean="0"/>
-              <a:t>25/02/2019</a:t>
+              <a:t>01/07/2019</a:t>
             </a:fld>
             <a:endParaRPr lang="es-ES"/>
           </a:p>
@@ -455,7 +456,7 @@
           <a:p>
             <a:fld id="{9CE34BDE-E087-4BFD-B407-AA69D846F212}" type="slidenum">
               <a:rPr lang="es-ES" smtClean="0"/>
-              <a:t>‹Nº›</a:t>
+              <a:t>‹#›</a:t>
             </a:fld>
             <a:endParaRPr lang="es-ES"/>
           </a:p>
@@ -593,7 +594,7 @@
           <a:p>
             <a:fld id="{46EBF78D-C51E-41E0-96A2-F35EA2168B7C}" type="datetimeFigureOut">
               <a:rPr lang="es-ES" smtClean="0"/>
-              <a:t>25/02/2019</a:t>
+              <a:t>01/07/2019</a:t>
             </a:fld>
             <a:endParaRPr lang="es-ES"/>
           </a:p>
@@ -635,7 +636,7 @@
           <a:p>
             <a:fld id="{9CE34BDE-E087-4BFD-B407-AA69D846F212}" type="slidenum">
               <a:rPr lang="es-ES" smtClean="0"/>
-              <a:t>‹Nº›</a:t>
+              <a:t>‹#›</a:t>
             </a:fld>
             <a:endParaRPr lang="es-ES"/>
           </a:p>
@@ -763,7 +764,7 @@
           <a:p>
             <a:fld id="{46EBF78D-C51E-41E0-96A2-F35EA2168B7C}" type="datetimeFigureOut">
               <a:rPr lang="es-ES" smtClean="0"/>
-              <a:t>25/02/2019</a:t>
+              <a:t>01/07/2019</a:t>
             </a:fld>
             <a:endParaRPr lang="es-ES"/>
           </a:p>
@@ -805,7 +806,7 @@
           <a:p>
             <a:fld id="{9CE34BDE-E087-4BFD-B407-AA69D846F212}" type="slidenum">
               <a:rPr lang="es-ES" smtClean="0"/>
-              <a:t>‹Nº›</a:t>
+              <a:t>‹#›</a:t>
             </a:fld>
             <a:endParaRPr lang="es-ES"/>
           </a:p>
@@ -1009,7 +1010,7 @@
           <a:p>
             <a:fld id="{46EBF78D-C51E-41E0-96A2-F35EA2168B7C}" type="datetimeFigureOut">
               <a:rPr lang="es-ES" smtClean="0"/>
-              <a:t>25/02/2019</a:t>
+              <a:t>01/07/2019</a:t>
             </a:fld>
             <a:endParaRPr lang="es-ES"/>
           </a:p>
@@ -1051,7 +1052,7 @@
           <a:p>
             <a:fld id="{9CE34BDE-E087-4BFD-B407-AA69D846F212}" type="slidenum">
               <a:rPr lang="es-ES" smtClean="0"/>
-              <a:t>‹Nº›</a:t>
+              <a:t>‹#›</a:t>
             </a:fld>
             <a:endParaRPr lang="es-ES"/>
           </a:p>
@@ -1241,7 +1242,7 @@
           <a:p>
             <a:fld id="{46EBF78D-C51E-41E0-96A2-F35EA2168B7C}" type="datetimeFigureOut">
               <a:rPr lang="es-ES" smtClean="0"/>
-              <a:t>25/02/2019</a:t>
+              <a:t>01/07/2019</a:t>
             </a:fld>
             <a:endParaRPr lang="es-ES"/>
           </a:p>
@@ -1283,7 +1284,7 @@
           <a:p>
             <a:fld id="{9CE34BDE-E087-4BFD-B407-AA69D846F212}" type="slidenum">
               <a:rPr lang="es-ES" smtClean="0"/>
-              <a:t>‹Nº›</a:t>
+              <a:t>‹#›</a:t>
             </a:fld>
             <a:endParaRPr lang="es-ES"/>
           </a:p>
@@ -1608,7 +1609,7 @@
           <a:p>
             <a:fld id="{46EBF78D-C51E-41E0-96A2-F35EA2168B7C}" type="datetimeFigureOut">
               <a:rPr lang="es-ES" smtClean="0"/>
-              <a:t>25/02/2019</a:t>
+              <a:t>01/07/2019</a:t>
             </a:fld>
             <a:endParaRPr lang="es-ES"/>
           </a:p>
@@ -1650,7 +1651,7 @@
           <a:p>
             <a:fld id="{9CE34BDE-E087-4BFD-B407-AA69D846F212}" type="slidenum">
               <a:rPr lang="es-ES" smtClean="0"/>
-              <a:t>‹Nº›</a:t>
+              <a:t>‹#›</a:t>
             </a:fld>
             <a:endParaRPr lang="es-ES"/>
           </a:p>
@@ -1726,7 +1727,7 @@
           <a:p>
             <a:fld id="{46EBF78D-C51E-41E0-96A2-F35EA2168B7C}" type="datetimeFigureOut">
               <a:rPr lang="es-ES" smtClean="0"/>
-              <a:t>25/02/2019</a:t>
+              <a:t>01/07/2019</a:t>
             </a:fld>
             <a:endParaRPr lang="es-ES"/>
           </a:p>
@@ -1768,7 +1769,7 @@
           <a:p>
             <a:fld id="{9CE34BDE-E087-4BFD-B407-AA69D846F212}" type="slidenum">
               <a:rPr lang="es-ES" smtClean="0"/>
-              <a:t>‹Nº›</a:t>
+              <a:t>‹#›</a:t>
             </a:fld>
             <a:endParaRPr lang="es-ES"/>
           </a:p>
@@ -1821,7 +1822,7 @@
           <a:p>
             <a:fld id="{46EBF78D-C51E-41E0-96A2-F35EA2168B7C}" type="datetimeFigureOut">
               <a:rPr lang="es-ES" smtClean="0"/>
-              <a:t>25/02/2019</a:t>
+              <a:t>01/07/2019</a:t>
             </a:fld>
             <a:endParaRPr lang="es-ES"/>
           </a:p>
@@ -1863,7 +1864,7 @@
           <a:p>
             <a:fld id="{9CE34BDE-E087-4BFD-B407-AA69D846F212}" type="slidenum">
               <a:rPr lang="es-ES" smtClean="0"/>
-              <a:t>‹Nº›</a:t>
+              <a:t>‹#›</a:t>
             </a:fld>
             <a:endParaRPr lang="es-ES"/>
           </a:p>
@@ -2098,7 +2099,7 @@
           <a:p>
             <a:fld id="{46EBF78D-C51E-41E0-96A2-F35EA2168B7C}" type="datetimeFigureOut">
               <a:rPr lang="es-ES" smtClean="0"/>
-              <a:t>25/02/2019</a:t>
+              <a:t>01/07/2019</a:t>
             </a:fld>
             <a:endParaRPr lang="es-ES"/>
           </a:p>
@@ -2140,7 +2141,7 @@
           <a:p>
             <a:fld id="{9CE34BDE-E087-4BFD-B407-AA69D846F212}" type="slidenum">
               <a:rPr lang="es-ES" smtClean="0"/>
-              <a:t>‹Nº›</a:t>
+              <a:t>‹#›</a:t>
             </a:fld>
             <a:endParaRPr lang="es-ES"/>
           </a:p>
@@ -2351,7 +2352,7 @@
           <a:p>
             <a:fld id="{46EBF78D-C51E-41E0-96A2-F35EA2168B7C}" type="datetimeFigureOut">
               <a:rPr lang="es-ES" smtClean="0"/>
-              <a:t>25/02/2019</a:t>
+              <a:t>01/07/2019</a:t>
             </a:fld>
             <a:endParaRPr lang="es-ES"/>
           </a:p>
@@ -2393,7 +2394,7 @@
           <a:p>
             <a:fld id="{9CE34BDE-E087-4BFD-B407-AA69D846F212}" type="slidenum">
               <a:rPr lang="es-ES" smtClean="0"/>
-              <a:t>‹Nº›</a:t>
+              <a:t>‹#›</a:t>
             </a:fld>
             <a:endParaRPr lang="es-ES"/>
           </a:p>
@@ -2564,7 +2565,7 @@
           <a:p>
             <a:fld id="{46EBF78D-C51E-41E0-96A2-F35EA2168B7C}" type="datetimeFigureOut">
               <a:rPr lang="es-ES" smtClean="0"/>
-              <a:t>25/02/2019</a:t>
+              <a:t>01/07/2019</a:t>
             </a:fld>
             <a:endParaRPr lang="es-ES"/>
           </a:p>
@@ -2642,7 +2643,7 @@
           <a:p>
             <a:fld id="{9CE34BDE-E087-4BFD-B407-AA69D846F212}" type="slidenum">
               <a:rPr lang="es-ES" smtClean="0"/>
-              <a:t>‹Nº›</a:t>
+              <a:t>‹#›</a:t>
             </a:fld>
             <a:endParaRPr lang="es-ES"/>
           </a:p>
@@ -4764,6 +4765,1901 @@
 </p:sld>
 </file>
 
+<file path=ppt/slides/slide2.xml><?xml version="1.0" encoding="utf-8"?>
+<p:sld xmlns:a="http://schemas.openxmlformats.org/drawingml/2006/main" xmlns:r="http://schemas.openxmlformats.org/officeDocument/2006/relationships" xmlns:p="http://schemas.openxmlformats.org/presentationml/2006/main">
+  <p:cSld>
+    <p:spTree>
+      <p:nvGrpSpPr>
+        <p:cNvPr id="1" name=""/>
+        <p:cNvGrpSpPr/>
+        <p:nvPr/>
+      </p:nvGrpSpPr>
+      <p:grpSpPr>
+        <a:xfrm>
+          <a:off x="0" y="0"/>
+          <a:ext cx="0" cy="0"/>
+          <a:chOff x="0" y="0"/>
+          <a:chExt cx="0" cy="0"/>
+        </a:xfrm>
+      </p:grpSpPr>
+      <p:sp>
+        <p:nvSpPr>
+          <p:cNvPr id="2" name="CuadroTexto 1"/>
+          <p:cNvSpPr txBox="1"/>
+          <p:nvPr/>
+        </p:nvSpPr>
+        <p:spPr>
+          <a:xfrm>
+            <a:off x="4948518" y="228601"/>
+            <a:ext cx="2061911" cy="369332"/>
+          </a:xfrm>
+          <a:prstGeom prst="rect">
+            <a:avLst/>
+          </a:prstGeom>
+          <a:noFill/>
+        </p:spPr>
+        <p:txBody>
+          <a:bodyPr wrap="none" rtlCol="0">
+            <a:spAutoFit/>
+          </a:bodyPr>
+          <a:lstStyle/>
+          <a:p>
+            <a:r>
+              <a:rPr lang="es-ES" dirty="0" smtClean="0"/>
+              <a:t>So, </a:t>
+            </a:r>
+            <a:r>
+              <a:rPr lang="es-ES" dirty="0" err="1" smtClean="0"/>
+              <a:t>who</a:t>
+            </a:r>
+            <a:r>
+              <a:rPr lang="es-ES" dirty="0" smtClean="0"/>
+              <a:t> </a:t>
+            </a:r>
+            <a:r>
+              <a:rPr lang="es-ES" dirty="0" err="1" smtClean="0"/>
+              <a:t>does</a:t>
+            </a:r>
+            <a:r>
+              <a:rPr lang="es-ES" dirty="0" smtClean="0"/>
+              <a:t> </a:t>
+            </a:r>
+            <a:r>
+              <a:rPr lang="es-ES" dirty="0" err="1" smtClean="0"/>
+              <a:t>what</a:t>
+            </a:r>
+            <a:r>
+              <a:rPr lang="es-ES" dirty="0" smtClean="0"/>
+              <a:t>?</a:t>
+            </a:r>
+            <a:endParaRPr lang="es-ES" dirty="0"/>
+          </a:p>
+        </p:txBody>
+      </p:sp>
+      <p:sp>
+        <p:nvSpPr>
+          <p:cNvPr id="3" name="CuadroTexto 2"/>
+          <p:cNvSpPr txBox="1"/>
+          <p:nvPr/>
+        </p:nvSpPr>
+        <p:spPr>
+          <a:xfrm>
+            <a:off x="5402896" y="2804225"/>
+            <a:ext cx="749244" cy="369332"/>
+          </a:xfrm>
+          <a:prstGeom prst="rect">
+            <a:avLst/>
+          </a:prstGeom>
+          <a:noFill/>
+          <a:ln>
+            <a:solidFill>
+              <a:schemeClr val="accent1"/>
+            </a:solidFill>
+          </a:ln>
+        </p:spPr>
+        <p:txBody>
+          <a:bodyPr wrap="none" rtlCol="0">
+            <a:spAutoFit/>
+          </a:bodyPr>
+          <a:lstStyle/>
+          <a:p>
+            <a:pPr algn="ctr"/>
+            <a:r>
+              <a:rPr lang="es-ES" b="1" dirty="0" err="1" smtClean="0">
+                <a:solidFill>
+                  <a:schemeClr val="accent1">
+                    <a:lumMod val="50000"/>
+                  </a:schemeClr>
+                </a:solidFill>
+              </a:rPr>
+              <a:t>RPaM</a:t>
+            </a:r>
+            <a:endParaRPr lang="es-ES" b="1" dirty="0">
+              <a:solidFill>
+                <a:schemeClr val="accent1">
+                  <a:lumMod val="50000"/>
+                </a:schemeClr>
+              </a:solidFill>
+            </a:endParaRPr>
+          </a:p>
+        </p:txBody>
+      </p:sp>
+      <p:sp>
+        <p:nvSpPr>
+          <p:cNvPr id="6" name="CuadroTexto 5"/>
+          <p:cNvSpPr txBox="1"/>
+          <p:nvPr/>
+        </p:nvSpPr>
+        <p:spPr>
+          <a:xfrm>
+            <a:off x="4728669" y="4219846"/>
+            <a:ext cx="2113912" cy="369332"/>
+          </a:xfrm>
+          <a:prstGeom prst="rect">
+            <a:avLst/>
+          </a:prstGeom>
+          <a:noFill/>
+          <a:ln>
+            <a:solidFill>
+              <a:schemeClr val="accent1"/>
+            </a:solidFill>
+          </a:ln>
+        </p:spPr>
+        <p:txBody>
+          <a:bodyPr wrap="none" rtlCol="0">
+            <a:spAutoFit/>
+          </a:bodyPr>
+          <a:lstStyle/>
+          <a:p>
+            <a:pPr algn="ctr"/>
+            <a:r>
+              <a:rPr lang="es-ES" b="1" dirty="0" smtClean="0">
+                <a:solidFill>
+                  <a:schemeClr val="accent1">
+                    <a:lumMod val="50000"/>
+                  </a:schemeClr>
+                </a:solidFill>
+              </a:rPr>
+              <a:t>eIDAS </a:t>
+            </a:r>
+            <a:r>
+              <a:rPr lang="es-ES" b="1" dirty="0" err="1" smtClean="0">
+                <a:solidFill>
+                  <a:schemeClr val="accent1">
+                    <a:lumMod val="50000"/>
+                  </a:schemeClr>
+                </a:solidFill>
+              </a:rPr>
+              <a:t>infrastructure</a:t>
+            </a:r>
+            <a:endParaRPr lang="es-ES" b="1" dirty="0">
+              <a:solidFill>
+                <a:schemeClr val="accent1">
+                  <a:lumMod val="50000"/>
+                </a:schemeClr>
+              </a:solidFill>
+            </a:endParaRPr>
+          </a:p>
+        </p:txBody>
+      </p:sp>
+      <p:sp>
+        <p:nvSpPr>
+          <p:cNvPr id="7" name="CuadroTexto 6"/>
+          <p:cNvSpPr txBox="1"/>
+          <p:nvPr/>
+        </p:nvSpPr>
+        <p:spPr>
+          <a:xfrm>
+            <a:off x="4529227" y="1032436"/>
+            <a:ext cx="2532360" cy="369332"/>
+          </a:xfrm>
+          <a:prstGeom prst="rect">
+            <a:avLst/>
+          </a:prstGeom>
+          <a:noFill/>
+          <a:ln>
+            <a:solidFill>
+              <a:schemeClr val="accent1"/>
+            </a:solidFill>
+          </a:ln>
+        </p:spPr>
+        <p:txBody>
+          <a:bodyPr wrap="none" rtlCol="0">
+            <a:spAutoFit/>
+          </a:bodyPr>
+          <a:lstStyle/>
+          <a:p>
+            <a:r>
+              <a:rPr lang="es-ES" b="1" dirty="0" smtClean="0">
+                <a:solidFill>
+                  <a:schemeClr val="accent1">
+                    <a:lumMod val="50000"/>
+                  </a:schemeClr>
+                </a:solidFill>
+              </a:rPr>
+              <a:t>EU Catalogue of </a:t>
+            </a:r>
+            <a:r>
+              <a:rPr lang="es-ES" b="1" dirty="0" err="1" smtClean="0">
+                <a:solidFill>
+                  <a:schemeClr val="accent1">
+                    <a:lumMod val="50000"/>
+                  </a:schemeClr>
+                </a:solidFill>
+              </a:rPr>
+              <a:t>Services</a:t>
+            </a:r>
+            <a:endParaRPr lang="es-ES" b="1" dirty="0">
+              <a:solidFill>
+                <a:schemeClr val="accent1">
+                  <a:lumMod val="50000"/>
+                </a:schemeClr>
+              </a:solidFill>
+            </a:endParaRPr>
+          </a:p>
+        </p:txBody>
+      </p:sp>
+      <p:sp>
+        <p:nvSpPr>
+          <p:cNvPr id="8" name="CuadroTexto 7"/>
+          <p:cNvSpPr txBox="1"/>
+          <p:nvPr/>
+        </p:nvSpPr>
+        <p:spPr>
+          <a:xfrm>
+            <a:off x="9107637" y="2804225"/>
+            <a:ext cx="909223" cy="369332"/>
+          </a:xfrm>
+          <a:prstGeom prst="rect">
+            <a:avLst/>
+          </a:prstGeom>
+          <a:noFill/>
+          <a:ln>
+            <a:solidFill>
+              <a:schemeClr val="accent1"/>
+            </a:solidFill>
+          </a:ln>
+        </p:spPr>
+        <p:txBody>
+          <a:bodyPr wrap="none" rtlCol="0">
+            <a:spAutoFit/>
+          </a:bodyPr>
+          <a:lstStyle/>
+          <a:p>
+            <a:pPr algn="ctr"/>
+            <a:r>
+              <a:rPr lang="es-ES" b="1" dirty="0" smtClean="0">
+                <a:solidFill>
+                  <a:schemeClr val="accent1">
+                    <a:lumMod val="50000"/>
+                  </a:schemeClr>
+                </a:solidFill>
+              </a:rPr>
+              <a:t>e-</a:t>
+            </a:r>
+            <a:r>
+              <a:rPr lang="es-ES" b="1" dirty="0" err="1" smtClean="0">
+                <a:solidFill>
+                  <a:schemeClr val="accent1">
+                    <a:lumMod val="50000"/>
+                  </a:schemeClr>
+                </a:solidFill>
+              </a:rPr>
+              <a:t>Certis</a:t>
+            </a:r>
+            <a:endParaRPr lang="es-ES" b="1" dirty="0">
+              <a:solidFill>
+                <a:schemeClr val="accent1">
+                  <a:lumMod val="50000"/>
+                </a:schemeClr>
+              </a:solidFill>
+            </a:endParaRPr>
+          </a:p>
+        </p:txBody>
+      </p:sp>
+      <p:sp>
+        <p:nvSpPr>
+          <p:cNvPr id="9" name="CuadroTexto 8"/>
+          <p:cNvSpPr txBox="1"/>
+          <p:nvPr/>
+        </p:nvSpPr>
+        <p:spPr>
+          <a:xfrm>
+            <a:off x="1457800" y="2804225"/>
+            <a:ext cx="1719510" cy="369332"/>
+          </a:xfrm>
+          <a:prstGeom prst="rect">
+            <a:avLst/>
+          </a:prstGeom>
+          <a:noFill/>
+          <a:ln>
+            <a:solidFill>
+              <a:schemeClr val="accent1"/>
+            </a:solidFill>
+          </a:ln>
+        </p:spPr>
+        <p:txBody>
+          <a:bodyPr wrap="none" rtlCol="0">
+            <a:spAutoFit/>
+          </a:bodyPr>
+          <a:lstStyle/>
+          <a:p>
+            <a:pPr algn="ctr"/>
+            <a:r>
+              <a:rPr lang="es-ES" b="1" dirty="0" smtClean="0">
+                <a:solidFill>
+                  <a:schemeClr val="accent1">
+                    <a:lumMod val="50000"/>
+                  </a:schemeClr>
+                </a:solidFill>
+              </a:rPr>
+              <a:t>EU </a:t>
+            </a:r>
+            <a:r>
+              <a:rPr lang="es-ES" b="1" dirty="0" err="1" smtClean="0">
+                <a:solidFill>
+                  <a:schemeClr val="accent1">
+                    <a:lumMod val="50000"/>
+                  </a:schemeClr>
+                </a:solidFill>
+              </a:rPr>
+              <a:t>Vocabularies</a:t>
+            </a:r>
+            <a:endParaRPr lang="es-ES" b="1" dirty="0">
+              <a:solidFill>
+                <a:schemeClr val="accent1">
+                  <a:lumMod val="50000"/>
+                </a:schemeClr>
+              </a:solidFill>
+            </a:endParaRPr>
+          </a:p>
+        </p:txBody>
+      </p:sp>
+      <p:sp>
+        <p:nvSpPr>
+          <p:cNvPr id="11" name="CuadroTexto 10"/>
+          <p:cNvSpPr txBox="1"/>
+          <p:nvPr/>
+        </p:nvSpPr>
+        <p:spPr>
+          <a:xfrm>
+            <a:off x="3183085" y="4962709"/>
+            <a:ext cx="1733295" cy="369332"/>
+          </a:xfrm>
+          <a:prstGeom prst="rect">
+            <a:avLst/>
+          </a:prstGeom>
+          <a:noFill/>
+          <a:ln>
+            <a:solidFill>
+              <a:schemeClr val="accent1"/>
+            </a:solidFill>
+          </a:ln>
+        </p:spPr>
+        <p:txBody>
+          <a:bodyPr wrap="none" rtlCol="0">
+            <a:spAutoFit/>
+          </a:bodyPr>
+          <a:lstStyle/>
+          <a:p>
+            <a:r>
+              <a:rPr lang="es-ES" b="1" dirty="0" err="1" smtClean="0">
+                <a:solidFill>
+                  <a:schemeClr val="accent1">
+                    <a:lumMod val="50000"/>
+                  </a:schemeClr>
+                </a:solidFill>
+              </a:rPr>
+              <a:t>Service</a:t>
+            </a:r>
+            <a:r>
+              <a:rPr lang="es-ES" b="1" dirty="0" smtClean="0">
+                <a:solidFill>
+                  <a:schemeClr val="accent1">
+                    <a:lumMod val="50000"/>
+                  </a:schemeClr>
+                </a:solidFill>
+              </a:rPr>
+              <a:t> </a:t>
+            </a:r>
+            <a:r>
+              <a:rPr lang="es-ES" b="1" dirty="0" err="1" smtClean="0">
+                <a:solidFill>
+                  <a:schemeClr val="accent1">
+                    <a:lumMod val="50000"/>
+                  </a:schemeClr>
+                </a:solidFill>
+              </a:rPr>
+              <a:t>Provider</a:t>
+            </a:r>
+            <a:endParaRPr lang="es-ES" b="1" dirty="0">
+              <a:solidFill>
+                <a:schemeClr val="accent1">
+                  <a:lumMod val="50000"/>
+                </a:schemeClr>
+              </a:solidFill>
+            </a:endParaRPr>
+          </a:p>
+        </p:txBody>
+      </p:sp>
+      <p:sp>
+        <p:nvSpPr>
+          <p:cNvPr id="12" name="CuadroTexto 11"/>
+          <p:cNvSpPr txBox="1"/>
+          <p:nvPr/>
+        </p:nvSpPr>
+        <p:spPr>
+          <a:xfrm>
+            <a:off x="6437649" y="4962709"/>
+            <a:ext cx="1987788" cy="369332"/>
+          </a:xfrm>
+          <a:prstGeom prst="rect">
+            <a:avLst/>
+          </a:prstGeom>
+          <a:noFill/>
+          <a:ln>
+            <a:solidFill>
+              <a:schemeClr val="accent1"/>
+            </a:solidFill>
+          </a:ln>
+        </p:spPr>
+        <p:txBody>
+          <a:bodyPr wrap="none" rtlCol="0">
+            <a:spAutoFit/>
+          </a:bodyPr>
+          <a:lstStyle/>
+          <a:p>
+            <a:r>
+              <a:rPr lang="es-ES" b="1" dirty="0" smtClean="0">
+                <a:solidFill>
+                  <a:schemeClr val="accent1">
+                    <a:lumMod val="50000"/>
+                  </a:schemeClr>
+                </a:solidFill>
+              </a:rPr>
+              <a:t>eMandate </a:t>
+            </a:r>
+            <a:r>
+              <a:rPr lang="es-ES" b="1" dirty="0" err="1" smtClean="0">
+                <a:solidFill>
+                  <a:schemeClr val="accent1">
+                    <a:lumMod val="50000"/>
+                  </a:schemeClr>
+                </a:solidFill>
+              </a:rPr>
+              <a:t>Registry</a:t>
+            </a:r>
+            <a:endParaRPr lang="es-ES" b="1" dirty="0">
+              <a:solidFill>
+                <a:schemeClr val="accent1">
+                  <a:lumMod val="50000"/>
+                </a:schemeClr>
+              </a:solidFill>
+            </a:endParaRPr>
+          </a:p>
+        </p:txBody>
+      </p:sp>
+      <p:cxnSp>
+        <p:nvCxnSpPr>
+          <p:cNvPr id="14" name="Conector recto de flecha 13"/>
+          <p:cNvCxnSpPr>
+            <a:stCxn id="3" idx="0"/>
+            <a:endCxn id="7" idx="2"/>
+          </p:cNvCxnSpPr>
+          <p:nvPr/>
+        </p:nvCxnSpPr>
+        <p:spPr>
+          <a:xfrm flipV="1">
+            <a:off x="5777518" y="1401768"/>
+            <a:ext cx="17889" cy="1402457"/>
+          </a:xfrm>
+          <a:prstGeom prst="straightConnector1">
+            <a:avLst/>
+          </a:prstGeom>
+          <a:ln>
+            <a:headEnd type="triangle"/>
+            <a:tailEnd type="triangle"/>
+          </a:ln>
+        </p:spPr>
+        <p:style>
+          <a:lnRef idx="1">
+            <a:schemeClr val="accent1"/>
+          </a:lnRef>
+          <a:fillRef idx="0">
+            <a:schemeClr val="accent1"/>
+          </a:fillRef>
+          <a:effectRef idx="0">
+            <a:schemeClr val="accent1"/>
+          </a:effectRef>
+          <a:fontRef idx="minor">
+            <a:schemeClr val="tx1"/>
+          </a:fontRef>
+        </p:style>
+      </p:cxnSp>
+      <p:sp>
+        <p:nvSpPr>
+          <p:cNvPr id="15" name="CuadroTexto 14"/>
+          <p:cNvSpPr txBox="1"/>
+          <p:nvPr/>
+        </p:nvSpPr>
+        <p:spPr>
+          <a:xfrm>
+            <a:off x="4544604" y="1827919"/>
+            <a:ext cx="2465825" cy="461665"/>
+          </a:xfrm>
+          <a:prstGeom prst="rect">
+            <a:avLst/>
+          </a:prstGeom>
+          <a:solidFill>
+            <a:schemeClr val="bg1"/>
+          </a:solidFill>
+        </p:spPr>
+        <p:txBody>
+          <a:bodyPr wrap="square" rtlCol="0">
+            <a:spAutoFit/>
+          </a:bodyPr>
+          <a:lstStyle/>
+          <a:p>
+            <a:r>
+              <a:rPr lang="es-ES" sz="1200" dirty="0" err="1">
+                <a:solidFill>
+                  <a:schemeClr val="accent1">
+                    <a:lumMod val="50000"/>
+                  </a:schemeClr>
+                </a:solidFill>
+              </a:rPr>
+              <a:t>c</a:t>
+            </a:r>
+            <a:r>
+              <a:rPr lang="es-ES" sz="1200" dirty="0" err="1" smtClean="0">
+                <a:solidFill>
+                  <a:schemeClr val="accent1">
+                    <a:lumMod val="50000"/>
+                  </a:schemeClr>
+                </a:solidFill>
+              </a:rPr>
+              <a:t>ooperate</a:t>
+            </a:r>
+            <a:r>
+              <a:rPr lang="es-ES" sz="1200" dirty="0" smtClean="0">
+                <a:solidFill>
+                  <a:schemeClr val="accent1">
+                    <a:lumMod val="50000"/>
+                  </a:schemeClr>
+                </a:solidFill>
+              </a:rPr>
+              <a:t> in </a:t>
+            </a:r>
+            <a:r>
+              <a:rPr lang="es-ES" sz="1200" dirty="0" err="1" smtClean="0">
+                <a:solidFill>
+                  <a:schemeClr val="accent1">
+                    <a:lumMod val="50000"/>
+                  </a:schemeClr>
+                </a:solidFill>
+              </a:rPr>
+              <a:t>the</a:t>
+            </a:r>
+            <a:r>
+              <a:rPr lang="es-ES" sz="1200" dirty="0" smtClean="0">
+                <a:solidFill>
+                  <a:schemeClr val="accent1">
+                    <a:lumMod val="50000"/>
+                  </a:schemeClr>
+                </a:solidFill>
+              </a:rPr>
+              <a:t> </a:t>
+            </a:r>
+            <a:r>
+              <a:rPr lang="es-ES" sz="1200" dirty="0" err="1" smtClean="0">
+                <a:solidFill>
+                  <a:schemeClr val="accent1">
+                    <a:lumMod val="50000"/>
+                  </a:schemeClr>
+                </a:solidFill>
+              </a:rPr>
+              <a:t>definition</a:t>
+            </a:r>
+            <a:r>
+              <a:rPr lang="es-ES" sz="1200" dirty="0" smtClean="0">
+                <a:solidFill>
+                  <a:schemeClr val="accent1">
+                    <a:lumMod val="50000"/>
+                  </a:schemeClr>
+                </a:solidFill>
+              </a:rPr>
+              <a:t> of </a:t>
+            </a:r>
+            <a:r>
+              <a:rPr lang="es-ES" sz="1200" dirty="0" err="1" smtClean="0">
+                <a:solidFill>
+                  <a:schemeClr val="accent1">
+                    <a:lumMod val="50000"/>
+                  </a:schemeClr>
+                </a:solidFill>
+              </a:rPr>
+              <a:t>the</a:t>
+            </a:r>
+            <a:r>
+              <a:rPr lang="es-ES" sz="1200" dirty="0" smtClean="0">
+                <a:solidFill>
+                  <a:schemeClr val="accent1">
+                    <a:lumMod val="50000"/>
+                  </a:schemeClr>
+                </a:solidFill>
+              </a:rPr>
+              <a:t> EU </a:t>
+            </a:r>
+            <a:r>
+              <a:rPr lang="es-ES" sz="1200" dirty="0" err="1" smtClean="0">
+                <a:solidFill>
+                  <a:schemeClr val="accent1">
+                    <a:lumMod val="50000"/>
+                  </a:schemeClr>
+                </a:solidFill>
+              </a:rPr>
+              <a:t>Power</a:t>
+            </a:r>
+            <a:r>
+              <a:rPr lang="es-ES" sz="1200" dirty="0" smtClean="0">
+                <a:solidFill>
+                  <a:schemeClr val="accent1">
+                    <a:lumMod val="50000"/>
+                  </a:schemeClr>
+                </a:solidFill>
+              </a:rPr>
+              <a:t> </a:t>
+            </a:r>
+            <a:r>
+              <a:rPr lang="es-ES" sz="1200" dirty="0" err="1" smtClean="0">
+                <a:solidFill>
+                  <a:schemeClr val="accent1">
+                    <a:lumMod val="50000"/>
+                  </a:schemeClr>
+                </a:solidFill>
+              </a:rPr>
+              <a:t>Taxonomy</a:t>
+            </a:r>
+            <a:r>
+              <a:rPr lang="es-ES" sz="1200" dirty="0" smtClean="0">
+                <a:solidFill>
+                  <a:schemeClr val="accent1">
+                    <a:lumMod val="50000"/>
+                  </a:schemeClr>
+                </a:solidFill>
+              </a:rPr>
+              <a:t>, </a:t>
+            </a:r>
+            <a:r>
+              <a:rPr lang="es-ES" sz="1200" dirty="0" err="1" smtClean="0">
+                <a:solidFill>
+                  <a:schemeClr val="accent1">
+                    <a:lumMod val="50000"/>
+                  </a:schemeClr>
+                </a:solidFill>
+              </a:rPr>
+              <a:t>eAC</a:t>
+            </a:r>
+            <a:r>
+              <a:rPr lang="es-ES" sz="1200" dirty="0" smtClean="0">
+                <a:solidFill>
+                  <a:schemeClr val="accent1">
+                    <a:lumMod val="50000"/>
+                  </a:schemeClr>
+                </a:solidFill>
+              </a:rPr>
+              <a:t> and PUC</a:t>
+            </a:r>
+          </a:p>
+        </p:txBody>
+      </p:sp>
+      <p:cxnSp>
+        <p:nvCxnSpPr>
+          <p:cNvPr id="20" name="Conector angular 19"/>
+          <p:cNvCxnSpPr>
+            <a:stCxn id="11" idx="0"/>
+            <a:endCxn id="6" idx="1"/>
+          </p:cNvCxnSpPr>
+          <p:nvPr/>
+        </p:nvCxnSpPr>
+        <p:spPr>
+          <a:xfrm rot="5400000" flipH="1" flipV="1">
+            <a:off x="4110103" y="4344143"/>
+            <a:ext cx="558197" cy="678936"/>
+          </a:xfrm>
+          <a:prstGeom prst="bentConnector2">
+            <a:avLst/>
+          </a:prstGeom>
+          <a:ln>
+            <a:headEnd type="none"/>
+            <a:tailEnd type="triangle"/>
+          </a:ln>
+        </p:spPr>
+        <p:style>
+          <a:lnRef idx="1">
+            <a:schemeClr val="accent1"/>
+          </a:lnRef>
+          <a:fillRef idx="0">
+            <a:schemeClr val="accent1"/>
+          </a:fillRef>
+          <a:effectRef idx="0">
+            <a:schemeClr val="accent1"/>
+          </a:effectRef>
+          <a:fontRef idx="minor">
+            <a:schemeClr val="tx1"/>
+          </a:fontRef>
+        </p:style>
+      </p:cxnSp>
+      <p:cxnSp>
+        <p:nvCxnSpPr>
+          <p:cNvPr id="21" name="Conector angular 20"/>
+          <p:cNvCxnSpPr>
+            <a:stCxn id="6" idx="3"/>
+            <a:endCxn id="12" idx="0"/>
+          </p:cNvCxnSpPr>
+          <p:nvPr/>
+        </p:nvCxnSpPr>
+        <p:spPr>
+          <a:xfrm>
+            <a:off x="6842581" y="4404512"/>
+            <a:ext cx="588962" cy="558197"/>
+          </a:xfrm>
+          <a:prstGeom prst="bentConnector2">
+            <a:avLst/>
+          </a:prstGeom>
+          <a:ln>
+            <a:headEnd type="triangle"/>
+            <a:tailEnd type="triangle"/>
+          </a:ln>
+        </p:spPr>
+        <p:style>
+          <a:lnRef idx="1">
+            <a:schemeClr val="accent1"/>
+          </a:lnRef>
+          <a:fillRef idx="0">
+            <a:schemeClr val="accent1"/>
+          </a:fillRef>
+          <a:effectRef idx="0">
+            <a:schemeClr val="accent1"/>
+          </a:effectRef>
+          <a:fontRef idx="minor">
+            <a:schemeClr val="tx1"/>
+          </a:fontRef>
+        </p:style>
+      </p:cxnSp>
+      <p:sp>
+        <p:nvSpPr>
+          <p:cNvPr id="26" name="CuadroTexto 25"/>
+          <p:cNvSpPr txBox="1"/>
+          <p:nvPr/>
+        </p:nvSpPr>
+        <p:spPr>
+          <a:xfrm>
+            <a:off x="2823538" y="4081345"/>
+            <a:ext cx="2061231" cy="276999"/>
+          </a:xfrm>
+          <a:prstGeom prst="rect">
+            <a:avLst/>
+          </a:prstGeom>
+          <a:noFill/>
+        </p:spPr>
+        <p:txBody>
+          <a:bodyPr wrap="square" rtlCol="0">
+            <a:spAutoFit/>
+          </a:bodyPr>
+          <a:lstStyle>
+            <a:defPPr>
+              <a:defRPr lang="es-ES"/>
+            </a:defPPr>
+            <a:lvl1pPr>
+              <a:defRPr sz="1200">
+                <a:solidFill>
+                  <a:schemeClr val="accent1">
+                    <a:lumMod val="50000"/>
+                  </a:schemeClr>
+                </a:solidFill>
+              </a:defRPr>
+            </a:lvl1pPr>
+          </a:lstStyle>
+          <a:p>
+            <a:r>
+              <a:rPr lang="es-ES" dirty="0" err="1" smtClean="0"/>
+              <a:t>requests</a:t>
+            </a:r>
+            <a:r>
+              <a:rPr lang="es-ES" dirty="0" smtClean="0"/>
+              <a:t> mandates </a:t>
+            </a:r>
+            <a:r>
+              <a:rPr lang="es-ES" dirty="0" err="1" smtClean="0"/>
+              <a:t>via</a:t>
+            </a:r>
+            <a:endParaRPr lang="es-ES" dirty="0"/>
+          </a:p>
+        </p:txBody>
+      </p:sp>
+      <p:sp>
+        <p:nvSpPr>
+          <p:cNvPr id="27" name="CuadroTexto 26"/>
+          <p:cNvSpPr txBox="1"/>
+          <p:nvPr/>
+        </p:nvSpPr>
+        <p:spPr>
+          <a:xfrm>
+            <a:off x="6878383" y="4064809"/>
+            <a:ext cx="2267354" cy="276999"/>
+          </a:xfrm>
+          <a:prstGeom prst="rect">
+            <a:avLst/>
+          </a:prstGeom>
+          <a:noFill/>
+        </p:spPr>
+        <p:txBody>
+          <a:bodyPr wrap="square" rtlCol="0">
+            <a:spAutoFit/>
+          </a:bodyPr>
+          <a:lstStyle>
+            <a:defPPr>
+              <a:defRPr lang="es-ES"/>
+            </a:defPPr>
+            <a:lvl1pPr>
+              <a:defRPr sz="1200">
+                <a:solidFill>
+                  <a:schemeClr val="accent1">
+                    <a:lumMod val="50000"/>
+                  </a:schemeClr>
+                </a:solidFill>
+              </a:defRPr>
+            </a:lvl1pPr>
+          </a:lstStyle>
+          <a:p>
+            <a:r>
+              <a:rPr lang="es-ES" dirty="0" err="1" smtClean="0"/>
+              <a:t>feeds</a:t>
+            </a:r>
+            <a:r>
+              <a:rPr lang="es-ES" dirty="0" smtClean="0"/>
+              <a:t> SP </a:t>
+            </a:r>
+            <a:r>
+              <a:rPr lang="es-ES" dirty="0" err="1" smtClean="0"/>
+              <a:t>with</a:t>
+            </a:r>
+            <a:r>
+              <a:rPr lang="es-ES" dirty="0" smtClean="0"/>
+              <a:t> mandate </a:t>
+            </a:r>
+            <a:r>
+              <a:rPr lang="es-ES" dirty="0" err="1" smtClean="0"/>
+              <a:t>via</a:t>
+            </a:r>
+            <a:endParaRPr lang="es-ES" dirty="0"/>
+          </a:p>
+        </p:txBody>
+      </p:sp>
+      <p:sp>
+        <p:nvSpPr>
+          <p:cNvPr id="34" name="CuadroTexto 33"/>
+          <p:cNvSpPr txBox="1"/>
+          <p:nvPr/>
+        </p:nvSpPr>
+        <p:spPr>
+          <a:xfrm>
+            <a:off x="5415506" y="5466957"/>
+            <a:ext cx="811441" cy="369332"/>
+          </a:xfrm>
+          <a:prstGeom prst="rect">
+            <a:avLst/>
+          </a:prstGeom>
+          <a:noFill/>
+          <a:ln>
+            <a:solidFill>
+              <a:schemeClr val="accent1"/>
+            </a:solidFill>
+          </a:ln>
+        </p:spPr>
+        <p:txBody>
+          <a:bodyPr wrap="none" rtlCol="0">
+            <a:spAutoFit/>
+          </a:bodyPr>
+          <a:lstStyle/>
+          <a:p>
+            <a:r>
+              <a:rPr lang="es-ES" b="1" dirty="0" smtClean="0">
+                <a:solidFill>
+                  <a:schemeClr val="accent1">
+                    <a:lumMod val="50000"/>
+                  </a:schemeClr>
+                </a:solidFill>
+              </a:rPr>
+              <a:t>EU MS</a:t>
+            </a:r>
+            <a:endParaRPr lang="es-ES" b="1" dirty="0">
+              <a:solidFill>
+                <a:schemeClr val="accent1">
+                  <a:lumMod val="50000"/>
+                </a:schemeClr>
+              </a:solidFill>
+            </a:endParaRPr>
+          </a:p>
+        </p:txBody>
+      </p:sp>
+      <p:cxnSp>
+        <p:nvCxnSpPr>
+          <p:cNvPr id="36" name="Conector angular 35"/>
+          <p:cNvCxnSpPr>
+            <a:stCxn id="11" idx="2"/>
+            <a:endCxn id="34" idx="1"/>
+          </p:cNvCxnSpPr>
+          <p:nvPr/>
+        </p:nvCxnSpPr>
+        <p:spPr>
+          <a:xfrm rot="16200000" flipH="1">
+            <a:off x="4572828" y="4808945"/>
+            <a:ext cx="319582" cy="1365773"/>
+          </a:xfrm>
+          <a:prstGeom prst="bentConnector2">
+            <a:avLst/>
+          </a:prstGeom>
+          <a:ln>
+            <a:tailEnd type="triangle"/>
+          </a:ln>
+        </p:spPr>
+        <p:style>
+          <a:lnRef idx="1">
+            <a:schemeClr val="accent1"/>
+          </a:lnRef>
+          <a:fillRef idx="0">
+            <a:schemeClr val="accent1"/>
+          </a:fillRef>
+          <a:effectRef idx="0">
+            <a:schemeClr val="accent1"/>
+          </a:effectRef>
+          <a:fontRef idx="minor">
+            <a:schemeClr val="tx1"/>
+          </a:fontRef>
+        </p:style>
+      </p:cxnSp>
+      <p:sp>
+        <p:nvSpPr>
+          <p:cNvPr id="38" name="CuadroTexto 37"/>
+          <p:cNvSpPr txBox="1"/>
+          <p:nvPr/>
+        </p:nvSpPr>
+        <p:spPr>
+          <a:xfrm>
+            <a:off x="3975025" y="5421901"/>
+            <a:ext cx="874163" cy="276999"/>
+          </a:xfrm>
+          <a:prstGeom prst="rect">
+            <a:avLst/>
+          </a:prstGeom>
+          <a:noFill/>
+        </p:spPr>
+        <p:txBody>
+          <a:bodyPr wrap="square" rtlCol="0">
+            <a:spAutoFit/>
+          </a:bodyPr>
+          <a:lstStyle>
+            <a:defPPr>
+              <a:defRPr lang="es-ES"/>
+            </a:defPPr>
+            <a:lvl1pPr>
+              <a:defRPr sz="1200">
+                <a:solidFill>
+                  <a:schemeClr val="accent1">
+                    <a:lumMod val="50000"/>
+                  </a:schemeClr>
+                </a:solidFill>
+              </a:defRPr>
+            </a:lvl1pPr>
+          </a:lstStyle>
+          <a:p>
+            <a:r>
+              <a:rPr lang="es-ES" dirty="0" err="1" smtClean="0"/>
+              <a:t>belongs</a:t>
+            </a:r>
+            <a:r>
+              <a:rPr lang="es-ES" dirty="0" smtClean="0"/>
+              <a:t> to</a:t>
+            </a:r>
+            <a:endParaRPr lang="es-ES" dirty="0"/>
+          </a:p>
+        </p:txBody>
+      </p:sp>
+      <p:cxnSp>
+        <p:nvCxnSpPr>
+          <p:cNvPr id="39" name="Conector angular 38"/>
+          <p:cNvCxnSpPr>
+            <a:stCxn id="12" idx="2"/>
+            <a:endCxn id="34" idx="3"/>
+          </p:cNvCxnSpPr>
+          <p:nvPr/>
+        </p:nvCxnSpPr>
+        <p:spPr>
+          <a:xfrm rot="5400000">
+            <a:off x="6669454" y="4889534"/>
+            <a:ext cx="319582" cy="1204596"/>
+          </a:xfrm>
+          <a:prstGeom prst="bentConnector2">
+            <a:avLst/>
+          </a:prstGeom>
+          <a:ln>
+            <a:tailEnd type="triangle"/>
+          </a:ln>
+        </p:spPr>
+        <p:style>
+          <a:lnRef idx="1">
+            <a:schemeClr val="accent1"/>
+          </a:lnRef>
+          <a:fillRef idx="0">
+            <a:schemeClr val="accent1"/>
+          </a:fillRef>
+          <a:effectRef idx="0">
+            <a:schemeClr val="accent1"/>
+          </a:effectRef>
+          <a:fontRef idx="minor">
+            <a:schemeClr val="tx1"/>
+          </a:fontRef>
+        </p:style>
+      </p:cxnSp>
+      <p:sp>
+        <p:nvSpPr>
+          <p:cNvPr id="42" name="CuadroTexto 41"/>
+          <p:cNvSpPr txBox="1"/>
+          <p:nvPr/>
+        </p:nvSpPr>
+        <p:spPr>
+          <a:xfrm>
+            <a:off x="6603925" y="5421901"/>
+            <a:ext cx="874163" cy="276999"/>
+          </a:xfrm>
+          <a:prstGeom prst="rect">
+            <a:avLst/>
+          </a:prstGeom>
+          <a:noFill/>
+        </p:spPr>
+        <p:txBody>
+          <a:bodyPr wrap="square" rtlCol="0">
+            <a:spAutoFit/>
+          </a:bodyPr>
+          <a:lstStyle>
+            <a:defPPr>
+              <a:defRPr lang="es-ES"/>
+            </a:defPPr>
+            <a:lvl1pPr>
+              <a:defRPr sz="1200">
+                <a:solidFill>
+                  <a:schemeClr val="accent1">
+                    <a:lumMod val="50000"/>
+                  </a:schemeClr>
+                </a:solidFill>
+              </a:defRPr>
+            </a:lvl1pPr>
+          </a:lstStyle>
+          <a:p>
+            <a:r>
+              <a:rPr lang="es-ES" dirty="0" err="1" smtClean="0"/>
+              <a:t>belongs</a:t>
+            </a:r>
+            <a:r>
+              <a:rPr lang="es-ES" dirty="0" smtClean="0"/>
+              <a:t> to</a:t>
+            </a:r>
+            <a:endParaRPr lang="es-ES" dirty="0"/>
+          </a:p>
+        </p:txBody>
+      </p:sp>
+      <p:cxnSp>
+        <p:nvCxnSpPr>
+          <p:cNvPr id="44" name="Conector angular 43"/>
+          <p:cNvCxnSpPr>
+            <a:stCxn id="34" idx="2"/>
+            <a:endCxn id="8" idx="2"/>
+          </p:cNvCxnSpPr>
+          <p:nvPr/>
+        </p:nvCxnSpPr>
+        <p:spPr>
+          <a:xfrm rot="5400000" flipH="1" flipV="1">
+            <a:off x="6360372" y="2634412"/>
+            <a:ext cx="2662732" cy="3741022"/>
+          </a:xfrm>
+          <a:prstGeom prst="bentConnector3">
+            <a:avLst>
+              <a:gd name="adj1" fmla="val -8585"/>
+            </a:avLst>
+          </a:prstGeom>
+          <a:ln>
+            <a:tailEnd type="triangle"/>
+          </a:ln>
+        </p:spPr>
+        <p:style>
+          <a:lnRef idx="1">
+            <a:schemeClr val="accent1"/>
+          </a:lnRef>
+          <a:fillRef idx="0">
+            <a:schemeClr val="accent1"/>
+          </a:fillRef>
+          <a:effectRef idx="0">
+            <a:schemeClr val="accent1"/>
+          </a:effectRef>
+          <a:fontRef idx="minor">
+            <a:schemeClr val="tx1"/>
+          </a:fontRef>
+        </p:style>
+      </p:cxnSp>
+      <p:sp>
+        <p:nvSpPr>
+          <p:cNvPr id="45" name="CuadroTexto 44"/>
+          <p:cNvSpPr txBox="1"/>
+          <p:nvPr/>
+        </p:nvSpPr>
+        <p:spPr>
+          <a:xfrm>
+            <a:off x="7493917" y="5751738"/>
+            <a:ext cx="2061231" cy="276999"/>
+          </a:xfrm>
+          <a:prstGeom prst="rect">
+            <a:avLst/>
+          </a:prstGeom>
+          <a:noFill/>
+        </p:spPr>
+        <p:txBody>
+          <a:bodyPr wrap="square" rtlCol="0">
+            <a:spAutoFit/>
+          </a:bodyPr>
+          <a:lstStyle>
+            <a:defPPr>
+              <a:defRPr lang="es-ES"/>
+            </a:defPPr>
+            <a:lvl1pPr>
+              <a:defRPr sz="1200">
+                <a:solidFill>
+                  <a:schemeClr val="accent1">
+                    <a:lumMod val="50000"/>
+                  </a:schemeClr>
+                </a:solidFill>
+              </a:defRPr>
+            </a:lvl1pPr>
+          </a:lstStyle>
+          <a:p>
+            <a:r>
+              <a:rPr lang="es-ES" dirty="0" err="1" smtClean="0"/>
+              <a:t>keeps</a:t>
+            </a:r>
+            <a:r>
+              <a:rPr lang="es-ES" dirty="0" smtClean="0"/>
+              <a:t> </a:t>
+            </a:r>
+            <a:r>
+              <a:rPr lang="es-ES" dirty="0" err="1" smtClean="0"/>
+              <a:t>service-specific</a:t>
+            </a:r>
+            <a:r>
+              <a:rPr lang="es-ES" dirty="0" smtClean="0"/>
+              <a:t> </a:t>
+            </a:r>
+            <a:r>
+              <a:rPr lang="es-ES" dirty="0" err="1" smtClean="0"/>
+              <a:t>eAC</a:t>
+            </a:r>
+            <a:r>
+              <a:rPr lang="es-ES" dirty="0" smtClean="0"/>
+              <a:t> in</a:t>
+            </a:r>
+            <a:endParaRPr lang="es-ES" dirty="0"/>
+          </a:p>
+        </p:txBody>
+      </p:sp>
+      <p:cxnSp>
+        <p:nvCxnSpPr>
+          <p:cNvPr id="46" name="Conector angular 45"/>
+          <p:cNvCxnSpPr>
+            <a:stCxn id="7" idx="3"/>
+            <a:endCxn id="8" idx="0"/>
+          </p:cNvCxnSpPr>
+          <p:nvPr/>
+        </p:nvCxnSpPr>
+        <p:spPr>
+          <a:xfrm>
+            <a:off x="7061587" y="1217102"/>
+            <a:ext cx="2500662" cy="1587123"/>
+          </a:xfrm>
+          <a:prstGeom prst="bentConnector2">
+            <a:avLst/>
+          </a:prstGeom>
+          <a:ln>
+            <a:tailEnd type="triangle"/>
+          </a:ln>
+        </p:spPr>
+        <p:style>
+          <a:lnRef idx="1">
+            <a:schemeClr val="accent1"/>
+          </a:lnRef>
+          <a:fillRef idx="0">
+            <a:schemeClr val="accent1"/>
+          </a:fillRef>
+          <a:effectRef idx="0">
+            <a:schemeClr val="accent1"/>
+          </a:effectRef>
+          <a:fontRef idx="minor">
+            <a:schemeClr val="tx1"/>
+          </a:fontRef>
+        </p:style>
+      </p:cxnSp>
+      <p:sp>
+        <p:nvSpPr>
+          <p:cNvPr id="50" name="CuadroTexto 49"/>
+          <p:cNvSpPr txBox="1"/>
+          <p:nvPr/>
+        </p:nvSpPr>
+        <p:spPr>
+          <a:xfrm>
+            <a:off x="7425944" y="989836"/>
+            <a:ext cx="2061231" cy="260597"/>
+          </a:xfrm>
+          <a:prstGeom prst="rect">
+            <a:avLst/>
+          </a:prstGeom>
+          <a:noFill/>
+        </p:spPr>
+        <p:txBody>
+          <a:bodyPr wrap="square" rtlCol="0">
+            <a:spAutoFit/>
+          </a:bodyPr>
+          <a:lstStyle>
+            <a:defPPr>
+              <a:defRPr lang="es-ES"/>
+            </a:defPPr>
+            <a:lvl1pPr>
+              <a:defRPr sz="1200">
+                <a:solidFill>
+                  <a:schemeClr val="accent1">
+                    <a:lumMod val="50000"/>
+                  </a:schemeClr>
+                </a:solidFill>
+              </a:defRPr>
+            </a:lvl1pPr>
+          </a:lstStyle>
+          <a:p>
+            <a:r>
+              <a:rPr lang="es-ES" dirty="0" err="1" smtClean="0"/>
+              <a:t>keeps</a:t>
+            </a:r>
+            <a:r>
+              <a:rPr lang="es-ES" dirty="0" smtClean="0"/>
+              <a:t> EU </a:t>
+            </a:r>
+            <a:r>
+              <a:rPr lang="es-ES" dirty="0" err="1" smtClean="0"/>
+              <a:t>eAC</a:t>
+            </a:r>
+            <a:r>
+              <a:rPr lang="es-ES" dirty="0" smtClean="0"/>
+              <a:t> and PUC in</a:t>
+            </a:r>
+            <a:endParaRPr lang="es-ES" dirty="0"/>
+          </a:p>
+        </p:txBody>
+      </p:sp>
+      <p:cxnSp>
+        <p:nvCxnSpPr>
+          <p:cNvPr id="52" name="Conector angular 51"/>
+          <p:cNvCxnSpPr>
+            <a:stCxn id="7" idx="1"/>
+            <a:endCxn id="9" idx="0"/>
+          </p:cNvCxnSpPr>
+          <p:nvPr/>
+        </p:nvCxnSpPr>
+        <p:spPr>
+          <a:xfrm rot="10800000" flipV="1">
+            <a:off x="2317555" y="1217101"/>
+            <a:ext cx="2211672" cy="1587123"/>
+          </a:xfrm>
+          <a:prstGeom prst="bentConnector2">
+            <a:avLst/>
+          </a:prstGeom>
+          <a:ln>
+            <a:tailEnd type="triangle"/>
+          </a:ln>
+        </p:spPr>
+        <p:style>
+          <a:lnRef idx="1">
+            <a:schemeClr val="accent1"/>
+          </a:lnRef>
+          <a:fillRef idx="0">
+            <a:schemeClr val="accent1"/>
+          </a:fillRef>
+          <a:effectRef idx="0">
+            <a:schemeClr val="accent1"/>
+          </a:effectRef>
+          <a:fontRef idx="minor">
+            <a:schemeClr val="tx1"/>
+          </a:fontRef>
+        </p:style>
+      </p:cxnSp>
+      <p:sp>
+        <p:nvSpPr>
+          <p:cNvPr id="54" name="CuadroTexto 53"/>
+          <p:cNvSpPr txBox="1"/>
+          <p:nvPr/>
+        </p:nvSpPr>
+        <p:spPr>
+          <a:xfrm>
+            <a:off x="2513543" y="937073"/>
+            <a:ext cx="2061231" cy="276999"/>
+          </a:xfrm>
+          <a:prstGeom prst="rect">
+            <a:avLst/>
+          </a:prstGeom>
+          <a:noFill/>
+        </p:spPr>
+        <p:txBody>
+          <a:bodyPr wrap="square" rtlCol="0">
+            <a:spAutoFit/>
+          </a:bodyPr>
+          <a:lstStyle>
+            <a:defPPr>
+              <a:defRPr lang="es-ES"/>
+            </a:defPPr>
+            <a:lvl1pPr>
+              <a:defRPr sz="1200">
+                <a:solidFill>
+                  <a:schemeClr val="accent1">
+                    <a:lumMod val="50000"/>
+                  </a:schemeClr>
+                </a:solidFill>
+              </a:defRPr>
+            </a:lvl1pPr>
+          </a:lstStyle>
+          <a:p>
+            <a:r>
+              <a:rPr lang="es-ES" dirty="0" err="1" smtClean="0"/>
+              <a:t>feeds</a:t>
+            </a:r>
+            <a:r>
+              <a:rPr lang="es-ES" dirty="0" smtClean="0"/>
+              <a:t> </a:t>
+            </a:r>
+            <a:r>
+              <a:rPr lang="es-ES" dirty="0" err="1" smtClean="0"/>
+              <a:t>with</a:t>
+            </a:r>
+            <a:r>
+              <a:rPr lang="es-ES" dirty="0" smtClean="0"/>
+              <a:t> </a:t>
+            </a:r>
+            <a:r>
+              <a:rPr lang="es-ES" dirty="0" err="1" smtClean="0"/>
+              <a:t>reference</a:t>
+            </a:r>
+            <a:r>
+              <a:rPr lang="es-ES" dirty="0" smtClean="0"/>
+              <a:t> data</a:t>
+            </a:r>
+            <a:endParaRPr lang="es-ES" dirty="0"/>
+          </a:p>
+        </p:txBody>
+      </p:sp>
+      <p:cxnSp>
+        <p:nvCxnSpPr>
+          <p:cNvPr id="58" name="Conector recto de flecha 57"/>
+          <p:cNvCxnSpPr>
+            <a:stCxn id="9" idx="3"/>
+            <a:endCxn id="3" idx="1"/>
+          </p:cNvCxnSpPr>
+          <p:nvPr/>
+        </p:nvCxnSpPr>
+        <p:spPr>
+          <a:xfrm>
+            <a:off x="3177310" y="2988891"/>
+            <a:ext cx="2225586" cy="0"/>
+          </a:xfrm>
+          <a:prstGeom prst="straightConnector1">
+            <a:avLst/>
+          </a:prstGeom>
+          <a:ln>
+            <a:headEnd type="triangle"/>
+            <a:tailEnd type="none"/>
+          </a:ln>
+        </p:spPr>
+        <p:style>
+          <a:lnRef idx="1">
+            <a:schemeClr val="accent1"/>
+          </a:lnRef>
+          <a:fillRef idx="0">
+            <a:schemeClr val="accent1"/>
+          </a:fillRef>
+          <a:effectRef idx="0">
+            <a:schemeClr val="accent1"/>
+          </a:effectRef>
+          <a:fontRef idx="minor">
+            <a:schemeClr val="tx1"/>
+          </a:fontRef>
+        </p:style>
+      </p:cxnSp>
+      <p:sp>
+        <p:nvSpPr>
+          <p:cNvPr id="59" name="CuadroTexto 58"/>
+          <p:cNvSpPr txBox="1"/>
+          <p:nvPr/>
+        </p:nvSpPr>
+        <p:spPr>
+          <a:xfrm>
+            <a:off x="3529530" y="2729022"/>
+            <a:ext cx="1852611" cy="276999"/>
+          </a:xfrm>
+          <a:prstGeom prst="rect">
+            <a:avLst/>
+          </a:prstGeom>
+          <a:noFill/>
+        </p:spPr>
+        <p:txBody>
+          <a:bodyPr wrap="square" rtlCol="0">
+            <a:spAutoFit/>
+          </a:bodyPr>
+          <a:lstStyle/>
+          <a:p>
+            <a:r>
+              <a:rPr lang="es-ES" sz="1200" dirty="0" smtClean="0">
+                <a:solidFill>
+                  <a:schemeClr val="accent1">
+                    <a:lumMod val="50000"/>
+                  </a:schemeClr>
+                </a:solidFill>
+              </a:rPr>
+              <a:t>uses </a:t>
+            </a:r>
+            <a:r>
+              <a:rPr lang="es-ES" sz="1200" dirty="0" err="1" smtClean="0">
+                <a:solidFill>
+                  <a:schemeClr val="accent1">
+                    <a:lumMod val="50000"/>
+                  </a:schemeClr>
+                </a:solidFill>
+              </a:rPr>
+              <a:t>reference</a:t>
+            </a:r>
+            <a:r>
+              <a:rPr lang="es-ES" sz="1200" dirty="0" smtClean="0">
+                <a:solidFill>
+                  <a:schemeClr val="accent1">
+                    <a:lumMod val="50000"/>
+                  </a:schemeClr>
+                </a:solidFill>
+              </a:rPr>
+              <a:t> data </a:t>
+            </a:r>
+            <a:r>
+              <a:rPr lang="es-ES" sz="1200" dirty="0" err="1" smtClean="0">
+                <a:solidFill>
+                  <a:schemeClr val="accent1">
+                    <a:lumMod val="50000"/>
+                  </a:schemeClr>
+                </a:solidFill>
+              </a:rPr>
+              <a:t>from</a:t>
+            </a:r>
+            <a:endParaRPr lang="es-ES" sz="1200" dirty="0" smtClean="0">
+              <a:solidFill>
+                <a:schemeClr val="accent1">
+                  <a:lumMod val="50000"/>
+                </a:schemeClr>
+              </a:solidFill>
+            </a:endParaRPr>
+          </a:p>
+        </p:txBody>
+      </p:sp>
+      <p:cxnSp>
+        <p:nvCxnSpPr>
+          <p:cNvPr id="61" name="Conector angular 60"/>
+          <p:cNvCxnSpPr>
+            <a:stCxn id="8" idx="3"/>
+            <a:endCxn id="9" idx="2"/>
+          </p:cNvCxnSpPr>
+          <p:nvPr/>
+        </p:nvCxnSpPr>
+        <p:spPr>
+          <a:xfrm flipH="1">
+            <a:off x="2317555" y="2988891"/>
+            <a:ext cx="7699305" cy="184666"/>
+          </a:xfrm>
+          <a:prstGeom prst="bentConnector4">
+            <a:avLst>
+              <a:gd name="adj1" fmla="val -2969"/>
+              <a:gd name="adj2" fmla="val 1991252"/>
+            </a:avLst>
+          </a:prstGeom>
+          <a:ln>
+            <a:tailEnd type="triangle"/>
+          </a:ln>
+        </p:spPr>
+        <p:style>
+          <a:lnRef idx="1">
+            <a:schemeClr val="accent1"/>
+          </a:lnRef>
+          <a:fillRef idx="0">
+            <a:schemeClr val="accent1"/>
+          </a:fillRef>
+          <a:effectRef idx="0">
+            <a:schemeClr val="accent1"/>
+          </a:effectRef>
+          <a:fontRef idx="minor">
+            <a:schemeClr val="tx1"/>
+          </a:fontRef>
+        </p:style>
+      </p:cxnSp>
+      <p:sp>
+        <p:nvSpPr>
+          <p:cNvPr id="63" name="CuadroTexto 62"/>
+          <p:cNvSpPr txBox="1"/>
+          <p:nvPr/>
+        </p:nvSpPr>
+        <p:spPr>
+          <a:xfrm>
+            <a:off x="5382141" y="6324069"/>
+            <a:ext cx="1852611" cy="335169"/>
+          </a:xfrm>
+          <a:prstGeom prst="rect">
+            <a:avLst/>
+          </a:prstGeom>
+          <a:noFill/>
+        </p:spPr>
+        <p:txBody>
+          <a:bodyPr wrap="square" rtlCol="0">
+            <a:spAutoFit/>
+          </a:bodyPr>
+          <a:lstStyle/>
+          <a:p>
+            <a:r>
+              <a:rPr lang="es-ES" sz="1200" dirty="0" smtClean="0">
+                <a:solidFill>
+                  <a:schemeClr val="accent1">
+                    <a:lumMod val="50000"/>
+                  </a:schemeClr>
+                </a:solidFill>
+              </a:rPr>
+              <a:t>uses </a:t>
+            </a:r>
+            <a:r>
+              <a:rPr lang="es-ES" sz="1200" dirty="0" err="1" smtClean="0">
+                <a:solidFill>
+                  <a:schemeClr val="accent1">
+                    <a:lumMod val="50000"/>
+                  </a:schemeClr>
+                </a:solidFill>
+              </a:rPr>
+              <a:t>reference</a:t>
+            </a:r>
+            <a:r>
+              <a:rPr lang="es-ES" sz="1200" dirty="0" smtClean="0">
+                <a:solidFill>
+                  <a:schemeClr val="accent1">
+                    <a:lumMod val="50000"/>
+                  </a:schemeClr>
+                </a:solidFill>
+              </a:rPr>
+              <a:t> data </a:t>
+            </a:r>
+            <a:r>
+              <a:rPr lang="es-ES" sz="1200" dirty="0" err="1" smtClean="0">
+                <a:solidFill>
+                  <a:schemeClr val="accent1">
+                    <a:lumMod val="50000"/>
+                  </a:schemeClr>
+                </a:solidFill>
+              </a:rPr>
+              <a:t>from</a:t>
+            </a:r>
+            <a:endParaRPr lang="es-ES" sz="1200" dirty="0" smtClean="0">
+              <a:solidFill>
+                <a:schemeClr val="accent1">
+                  <a:lumMod val="50000"/>
+                </a:schemeClr>
+              </a:solidFill>
+            </a:endParaRPr>
+          </a:p>
+        </p:txBody>
+      </p:sp>
+      <p:cxnSp>
+        <p:nvCxnSpPr>
+          <p:cNvPr id="67" name="Conector recto de flecha 66"/>
+          <p:cNvCxnSpPr>
+            <a:stCxn id="6" idx="0"/>
+            <a:endCxn id="3" idx="2"/>
+          </p:cNvCxnSpPr>
+          <p:nvPr/>
+        </p:nvCxnSpPr>
+        <p:spPr>
+          <a:xfrm flipH="1" flipV="1">
+            <a:off x="5777518" y="3173557"/>
+            <a:ext cx="8107" cy="1046289"/>
+          </a:xfrm>
+          <a:prstGeom prst="straightConnector1">
+            <a:avLst/>
+          </a:prstGeom>
+          <a:ln>
+            <a:tailEnd type="triangle"/>
+          </a:ln>
+        </p:spPr>
+        <p:style>
+          <a:lnRef idx="1">
+            <a:schemeClr val="accent1"/>
+          </a:lnRef>
+          <a:fillRef idx="0">
+            <a:schemeClr val="accent1"/>
+          </a:fillRef>
+          <a:effectRef idx="0">
+            <a:schemeClr val="accent1"/>
+          </a:effectRef>
+          <a:fontRef idx="minor">
+            <a:schemeClr val="tx1"/>
+          </a:fontRef>
+        </p:style>
+      </p:cxnSp>
+      <p:sp>
+        <p:nvSpPr>
+          <p:cNvPr id="68" name="CuadroTexto 67"/>
+          <p:cNvSpPr txBox="1"/>
+          <p:nvPr/>
+        </p:nvSpPr>
+        <p:spPr>
+          <a:xfrm>
+            <a:off x="5785625" y="3480683"/>
+            <a:ext cx="2267354" cy="276999"/>
+          </a:xfrm>
+          <a:prstGeom prst="rect">
+            <a:avLst/>
+          </a:prstGeom>
+          <a:noFill/>
+        </p:spPr>
+        <p:txBody>
+          <a:bodyPr wrap="square" rtlCol="0">
+            <a:spAutoFit/>
+          </a:bodyPr>
+          <a:lstStyle>
+            <a:defPPr>
+              <a:defRPr lang="es-ES"/>
+            </a:defPPr>
+            <a:lvl1pPr>
+              <a:defRPr sz="1200">
+                <a:solidFill>
+                  <a:schemeClr val="accent1">
+                    <a:lumMod val="50000"/>
+                  </a:schemeClr>
+                </a:solidFill>
+              </a:defRPr>
+            </a:lvl1pPr>
+          </a:lstStyle>
+          <a:p>
+            <a:r>
+              <a:rPr lang="es-ES" dirty="0" err="1" smtClean="0"/>
+              <a:t>conveys</a:t>
+            </a:r>
+            <a:r>
+              <a:rPr lang="es-ES" dirty="0" smtClean="0"/>
+              <a:t> </a:t>
+            </a:r>
+            <a:r>
+              <a:rPr lang="es-ES" dirty="0" err="1" smtClean="0"/>
+              <a:t>realisations</a:t>
+            </a:r>
+            <a:r>
+              <a:rPr lang="es-ES" dirty="0" smtClean="0"/>
+              <a:t> of</a:t>
+            </a:r>
+            <a:endParaRPr lang="es-ES" dirty="0"/>
+          </a:p>
+        </p:txBody>
+      </p:sp>
+      <p:cxnSp>
+        <p:nvCxnSpPr>
+          <p:cNvPr id="69" name="Conector recto de flecha 68"/>
+          <p:cNvCxnSpPr>
+            <a:stCxn id="8" idx="1"/>
+            <a:endCxn id="3" idx="3"/>
+          </p:cNvCxnSpPr>
+          <p:nvPr/>
+        </p:nvCxnSpPr>
+        <p:spPr>
+          <a:xfrm flipH="1">
+            <a:off x="6152140" y="2988891"/>
+            <a:ext cx="2955497" cy="0"/>
+          </a:xfrm>
+          <a:prstGeom prst="straightConnector1">
+            <a:avLst/>
+          </a:prstGeom>
+          <a:ln>
+            <a:headEnd type="triangle"/>
+            <a:tailEnd type="none"/>
+          </a:ln>
+        </p:spPr>
+        <p:style>
+          <a:lnRef idx="1">
+            <a:schemeClr val="accent1"/>
+          </a:lnRef>
+          <a:fillRef idx="0">
+            <a:schemeClr val="accent1"/>
+          </a:fillRef>
+          <a:effectRef idx="0">
+            <a:schemeClr val="accent1"/>
+          </a:effectRef>
+          <a:fontRef idx="minor">
+            <a:schemeClr val="tx1"/>
+          </a:fontRef>
+        </p:style>
+      </p:cxnSp>
+      <p:sp>
+        <p:nvSpPr>
+          <p:cNvPr id="72" name="CuadroTexto 71"/>
+          <p:cNvSpPr txBox="1"/>
+          <p:nvPr/>
+        </p:nvSpPr>
+        <p:spPr>
+          <a:xfrm>
+            <a:off x="6582902" y="2715735"/>
+            <a:ext cx="1852611" cy="276999"/>
+          </a:xfrm>
+          <a:prstGeom prst="rect">
+            <a:avLst/>
+          </a:prstGeom>
+          <a:noFill/>
+        </p:spPr>
+        <p:txBody>
+          <a:bodyPr wrap="square" rtlCol="0">
+            <a:spAutoFit/>
+          </a:bodyPr>
+          <a:lstStyle/>
+          <a:p>
+            <a:r>
+              <a:rPr lang="es-ES" sz="1200" dirty="0" smtClean="0">
+                <a:solidFill>
+                  <a:schemeClr val="accent1">
+                    <a:lumMod val="50000"/>
+                  </a:schemeClr>
+                </a:solidFill>
+              </a:rPr>
+              <a:t>defines </a:t>
+            </a:r>
+            <a:r>
+              <a:rPr lang="es-ES" sz="1200" dirty="0" err="1" smtClean="0">
+                <a:solidFill>
+                  <a:schemeClr val="accent1">
+                    <a:lumMod val="50000"/>
+                  </a:schemeClr>
+                </a:solidFill>
+              </a:rPr>
+              <a:t>RPaM</a:t>
+            </a:r>
+            <a:r>
+              <a:rPr lang="es-ES" sz="1200" dirty="0" smtClean="0">
+                <a:solidFill>
+                  <a:schemeClr val="accent1">
+                    <a:lumMod val="50000"/>
+                  </a:schemeClr>
+                </a:solidFill>
+              </a:rPr>
+              <a:t> </a:t>
+            </a:r>
+            <a:r>
+              <a:rPr lang="es-ES" sz="1200" dirty="0" err="1" smtClean="0">
+                <a:solidFill>
+                  <a:schemeClr val="accent1">
+                    <a:lumMod val="50000"/>
+                  </a:schemeClr>
+                </a:solidFill>
+              </a:rPr>
+              <a:t>domain</a:t>
+            </a:r>
+            <a:r>
+              <a:rPr lang="es-ES" sz="1200" dirty="0" smtClean="0">
+                <a:solidFill>
+                  <a:schemeClr val="accent1">
+                    <a:lumMod val="50000"/>
+                  </a:schemeClr>
+                </a:solidFill>
+              </a:rPr>
+              <a:t> in</a:t>
+            </a:r>
+          </a:p>
+        </p:txBody>
+      </p:sp>
+      <p:sp>
+        <p:nvSpPr>
+          <p:cNvPr id="4" name="Rounded Rectangle 3"/>
+          <p:cNvSpPr/>
+          <p:nvPr/>
+        </p:nvSpPr>
+        <p:spPr>
+          <a:xfrm>
+            <a:off x="4213077" y="2512464"/>
+            <a:ext cx="6016239" cy="3516273"/>
+          </a:xfrm>
+          <a:prstGeom prst="roundRect">
+            <a:avLst/>
+          </a:prstGeom>
+          <a:solidFill>
+            <a:schemeClr val="accent1">
+              <a:alpha val="22000"/>
+            </a:schemeClr>
+          </a:solidFill>
+        </p:spPr>
+        <p:style>
+          <a:lnRef idx="2">
+            <a:schemeClr val="accent1">
+              <a:shade val="50000"/>
+            </a:schemeClr>
+          </a:lnRef>
+          <a:fillRef idx="1">
+            <a:schemeClr val="accent1"/>
+          </a:fillRef>
+          <a:effectRef idx="0">
+            <a:schemeClr val="accent1"/>
+          </a:effectRef>
+          <a:fontRef idx="minor">
+            <a:schemeClr val="lt1"/>
+          </a:fontRef>
+        </p:style>
+        <p:txBody>
+          <a:bodyPr rtlCol="0" anchor="ctr"/>
+          <a:lstStyle/>
+          <a:p>
+            <a:pPr algn="ctr"/>
+            <a:endParaRPr lang="en-GB"/>
+          </a:p>
+        </p:txBody>
+      </p:sp>
+      <p:sp>
+        <p:nvSpPr>
+          <p:cNvPr id="5" name="TextBox 4"/>
+          <p:cNvSpPr txBox="1"/>
+          <p:nvPr/>
+        </p:nvSpPr>
+        <p:spPr>
+          <a:xfrm rot="20016285">
+            <a:off x="7041991" y="4909390"/>
+            <a:ext cx="4328621" cy="830997"/>
+          </a:xfrm>
+          <a:prstGeom prst="rect">
+            <a:avLst/>
+          </a:prstGeom>
+          <a:noFill/>
+        </p:spPr>
+        <p:txBody>
+          <a:bodyPr wrap="none" rtlCol="0">
+            <a:spAutoFit/>
+          </a:bodyPr>
+          <a:lstStyle/>
+          <a:p>
+            <a:r>
+              <a:rPr lang="es-ES" sz="4800" dirty="0" smtClean="0">
+                <a:solidFill>
+                  <a:srgbClr val="C00000"/>
+                </a:solidFill>
+              </a:rPr>
+              <a:t>WHERE’S TOOP?</a:t>
+            </a:r>
+            <a:endParaRPr lang="en-GB" sz="4800" dirty="0">
+              <a:solidFill>
+                <a:srgbClr val="C00000"/>
+              </a:solidFill>
+            </a:endParaRPr>
+          </a:p>
+        </p:txBody>
+      </p:sp>
+    </p:spTree>
+    <p:extLst>
+      <p:ext uri="{BB962C8B-B14F-4D97-AF65-F5344CB8AC3E}">
+        <p14:creationId xmlns:p14="http://schemas.microsoft.com/office/powerpoint/2010/main" val="3327623217"/>
+      </p:ext>
+    </p:extLst>
+  </p:cSld>
+  <p:clrMapOvr>
+    <a:masterClrMapping/>
+  </p:clrMapOvr>
+</p:sld>
+</file>
+
 <file path=ppt/theme/theme1.xml><?xml version="1.0" encoding="utf-8"?>
 <a:theme xmlns:a="http://schemas.openxmlformats.org/drawingml/2006/main" name="Tema de Office">
   <a:themeElements>

</xml_diff>